<commit_message>
update for version 2 ppt
</commit_message>
<xml_diff>
--- a/javaScript.pptx
+++ b/javaScript.pptx
@@ -18,6 +18,10 @@
     <p:sldId id="263" r:id="rId15"/>
     <p:sldId id="264" r:id="rId16"/>
     <p:sldId id="265" r:id="rId17"/>
+    <p:sldId id="266" r:id="rId18"/>
+    <p:sldId id="267" r:id="rId19"/>
+    <p:sldId id="268" r:id="rId20"/>
+    <p:sldId id="269" r:id="rId21"/>
   </p:sldIdLst>
   <p:sldSz cx="13004800" cy="9753600"/>
   <p:notesSz cx="6858000" cy="9144000"/>
@@ -4863,6 +4867,2134 @@
 </p:sld>
 </file>
 
+<file path=ppt/slides/slide11.xml><?xml version="1.0" encoding="utf-8"?>
+<p:sld xmlns:a="http://schemas.openxmlformats.org/drawingml/2006/main" xmlns:r="http://schemas.openxmlformats.org/officeDocument/2006/relationships" xmlns:p="http://schemas.openxmlformats.org/presentationml/2006/main" showMasterSp="1" showMasterPhAnim="1">
+  <p:cSld>
+    <p:spTree>
+      <p:nvGrpSpPr>
+        <p:cNvPr id="1" name=""/>
+        <p:cNvGrpSpPr/>
+        <p:nvPr/>
+      </p:nvGrpSpPr>
+      <p:grpSpPr>
+        <a:xfrm>
+          <a:off x="0" y="0"/>
+          <a:ext cx="0" cy="0"/>
+          <a:chOff x="0" y="0"/>
+          <a:chExt cx="0" cy="0"/>
+        </a:xfrm>
+      </p:grpSpPr>
+      <p:sp>
+        <p:nvSpPr>
+          <p:cNvPr id="215" name="Javascript"/>
+          <p:cNvSpPr txBox="1"/>
+          <p:nvPr>
+            <p:ph type="body" idx="13"/>
+          </p:nvPr>
+        </p:nvSpPr>
+        <p:spPr>
+          <a:prstGeom prst="rect">
+            <a:avLst/>
+          </a:prstGeom>
+        </p:spPr>
+        <p:txBody>
+          <a:bodyPr/>
+          <a:lstStyle/>
+          <a:p>
+            <a:pPr/>
+            <a:r>
+              <a:t>Javascript</a:t>
+            </a:r>
+          </a:p>
+        </p:txBody>
+      </p:sp>
+      <p:sp>
+        <p:nvSpPr>
+          <p:cNvPr id="216" name="IIFE- Immediately invoked function expression"/>
+          <p:cNvSpPr txBox="1"/>
+          <p:nvPr>
+            <p:ph type="title"/>
+          </p:nvPr>
+        </p:nvSpPr>
+        <p:spPr>
+          <a:prstGeom prst="rect">
+            <a:avLst/>
+          </a:prstGeom>
+        </p:spPr>
+        <p:txBody>
+          <a:bodyPr/>
+          <a:lstStyle>
+            <a:lvl1pPr defTabSz="467359">
+              <a:spcBef>
+                <a:spcPts val="2200"/>
+              </a:spcBef>
+              <a:defRPr sz="4800"/>
+            </a:lvl1pPr>
+          </a:lstStyle>
+          <a:p>
+            <a:pPr/>
+            <a:r>
+              <a:t>IIFE- Immediately invoked function expression</a:t>
+            </a:r>
+          </a:p>
+        </p:txBody>
+      </p:sp>
+      <p:sp>
+        <p:nvSpPr>
+          <p:cNvPr id="217" name="Ways to write it…"/>
+          <p:cNvSpPr txBox="1"/>
+          <p:nvPr>
+            <p:ph type="body" idx="1"/>
+          </p:nvPr>
+        </p:nvSpPr>
+        <p:spPr>
+          <a:prstGeom prst="rect">
+            <a:avLst/>
+          </a:prstGeom>
+        </p:spPr>
+        <p:txBody>
+          <a:bodyPr/>
+          <a:lstStyle/>
+          <a:p>
+            <a:pPr/>
+            <a:r>
+              <a:t>Ways to write it</a:t>
+            </a:r>
+          </a:p>
+          <a:p>
+            <a:pPr/>
+            <a:r>
+              <a:t>Example: where to user it, jQuery</a:t>
+            </a:r>
+          </a:p>
+          <a:p>
+            <a:pPr/>
+            <a:r>
+              <a:t>Example: object util</a:t>
+            </a:r>
+          </a:p>
+        </p:txBody>
+      </p:sp>
+    </p:spTree>
+  </p:cSld>
+  <p:clrMapOvr>
+    <a:masterClrMapping/>
+  </p:clrMapOvr>
+  <p:transition xmlns:p14="http://schemas.microsoft.com/office/powerpoint/2010/main" spd="med" advClick="1"/>
+</p:sld>
+</file>
+
+<file path=ppt/slides/slide12.xml><?xml version="1.0" encoding="utf-8"?>
+<p:sld xmlns:a="http://schemas.openxmlformats.org/drawingml/2006/main" xmlns:r="http://schemas.openxmlformats.org/officeDocument/2006/relationships" xmlns:p="http://schemas.openxmlformats.org/presentationml/2006/main" showMasterSp="1" showMasterPhAnim="1">
+  <p:cSld>
+    <p:spTree>
+      <p:nvGrpSpPr>
+        <p:cNvPr id="1" name=""/>
+        <p:cNvGrpSpPr/>
+        <p:nvPr/>
+      </p:nvGrpSpPr>
+      <p:grpSpPr>
+        <a:xfrm>
+          <a:off x="0" y="0"/>
+          <a:ext cx="0" cy="0"/>
+          <a:chOff x="0" y="0"/>
+          <a:chExt cx="0" cy="0"/>
+        </a:xfrm>
+      </p:grpSpPr>
+      <p:sp>
+        <p:nvSpPr>
+          <p:cNvPr id="219" name="Javascript"/>
+          <p:cNvSpPr txBox="1"/>
+          <p:nvPr>
+            <p:ph type="body" idx="13"/>
+          </p:nvPr>
+        </p:nvSpPr>
+        <p:spPr>
+          <a:prstGeom prst="rect">
+            <a:avLst/>
+          </a:prstGeom>
+        </p:spPr>
+        <p:txBody>
+          <a:bodyPr/>
+          <a:lstStyle/>
+          <a:p>
+            <a:pPr/>
+            <a:r>
+              <a:t>Javascript</a:t>
+            </a:r>
+          </a:p>
+        </p:txBody>
+      </p:sp>
+      <p:sp>
+        <p:nvSpPr>
+          <p:cNvPr id="220" name="Prototype"/>
+          <p:cNvSpPr txBox="1"/>
+          <p:nvPr>
+            <p:ph type="title"/>
+          </p:nvPr>
+        </p:nvSpPr>
+        <p:spPr>
+          <a:prstGeom prst="rect">
+            <a:avLst/>
+          </a:prstGeom>
+        </p:spPr>
+        <p:txBody>
+          <a:bodyPr/>
+          <a:lstStyle>
+            <a:lvl1pPr defTabSz="467359">
+              <a:spcBef>
+                <a:spcPts val="2200"/>
+              </a:spcBef>
+              <a:defRPr sz="4800"/>
+            </a:lvl1pPr>
+          </a:lstStyle>
+          <a:p>
+            <a:pPr/>
+            <a:r>
+              <a:t>Prototype</a:t>
+            </a:r>
+          </a:p>
+        </p:txBody>
+      </p:sp>
+      <p:sp>
+        <p:nvSpPr>
+          <p:cNvPr id="221" name="Example"/>
+          <p:cNvSpPr txBox="1"/>
+          <p:nvPr>
+            <p:ph type="body" idx="1"/>
+          </p:nvPr>
+        </p:nvSpPr>
+        <p:spPr>
+          <a:prstGeom prst="rect">
+            <a:avLst/>
+          </a:prstGeom>
+        </p:spPr>
+        <p:txBody>
+          <a:bodyPr/>
+          <a:lstStyle/>
+          <a:p>
+            <a:pPr/>
+            <a:r>
+              <a:t>Example</a:t>
+            </a:r>
+          </a:p>
+        </p:txBody>
+      </p:sp>
+      <p:sp>
+        <p:nvSpPr>
+          <p:cNvPr id="222" name="Object1"/>
+          <p:cNvSpPr/>
+          <p:nvPr/>
+        </p:nvSpPr>
+        <p:spPr>
+          <a:xfrm>
+            <a:off x="2023370" y="3730094"/>
+            <a:ext cx="1270001" cy="1270001"/>
+          </a:xfrm>
+          <a:prstGeom prst="rect">
+            <a:avLst/>
+          </a:prstGeom>
+          <a:solidFill>
+            <a:schemeClr val="accent1"/>
+          </a:solidFill>
+          <a:ln w="12700">
+            <a:miter lim="400000"/>
+          </a:ln>
+          <a:extLst>
+            <a:ext uri="{C572A759-6A51-4108-AA02-DFA0A04FC94B}">
+              <ma14:wrappingTextBoxFlag xmlns:ma14="http://schemas.microsoft.com/office/mac/drawingml/2011/main" val="1"/>
+            </a:ext>
+          </a:extLst>
+        </p:spPr>
+        <p:txBody>
+          <a:bodyPr lIns="50800" tIns="50800" rIns="50800" bIns="50800" anchor="ctr"/>
+          <a:lstStyle>
+            <a:lvl1pPr algn="ctr">
+              <a:lnSpc>
+                <a:spcPct val="80000"/>
+              </a:lnSpc>
+              <a:spcBef>
+                <a:spcPts val="0"/>
+              </a:spcBef>
+              <a:defRPr cap="all" sz="2800">
+                <a:solidFill>
+                  <a:srgbClr val="FFFFFF"/>
+                </a:solidFill>
+                <a:latin typeface="+mn-lt"/>
+                <a:ea typeface="+mn-ea"/>
+                <a:cs typeface="+mn-cs"/>
+                <a:sym typeface="DIN Condensed"/>
+              </a:defRPr>
+            </a:lvl1pPr>
+          </a:lstStyle>
+          <a:p>
+            <a:pPr/>
+            <a:r>
+              <a:t>Object1</a:t>
+            </a:r>
+          </a:p>
+        </p:txBody>
+      </p:sp>
+      <p:sp>
+        <p:nvSpPr>
+          <p:cNvPr id="223" name="Prototype"/>
+          <p:cNvSpPr/>
+          <p:nvPr/>
+        </p:nvSpPr>
+        <p:spPr>
+          <a:xfrm>
+            <a:off x="6578795" y="3730094"/>
+            <a:ext cx="1270001" cy="1270001"/>
+          </a:xfrm>
+          <a:prstGeom prst="ellipse">
+            <a:avLst/>
+          </a:prstGeom>
+          <a:solidFill>
+            <a:schemeClr val="accent1"/>
+          </a:solidFill>
+          <a:ln w="12700">
+            <a:miter lim="400000"/>
+          </a:ln>
+          <a:extLst>
+            <a:ext uri="{C572A759-6A51-4108-AA02-DFA0A04FC94B}">
+              <ma14:wrappingTextBoxFlag xmlns:ma14="http://schemas.microsoft.com/office/mac/drawingml/2011/main" val="1"/>
+            </a:ext>
+          </a:extLst>
+        </p:spPr>
+        <p:txBody>
+          <a:bodyPr lIns="50800" tIns="50800" rIns="50800" bIns="50800" anchor="ctr"/>
+          <a:lstStyle>
+            <a:lvl1pPr algn="ctr">
+              <a:lnSpc>
+                <a:spcPct val="80000"/>
+              </a:lnSpc>
+              <a:spcBef>
+                <a:spcPts val="0"/>
+              </a:spcBef>
+              <a:defRPr cap="all" sz="2300">
+                <a:solidFill>
+                  <a:srgbClr val="FFFFFF"/>
+                </a:solidFill>
+                <a:latin typeface="+mn-lt"/>
+                <a:ea typeface="+mn-ea"/>
+                <a:cs typeface="+mn-cs"/>
+                <a:sym typeface="DIN Condensed"/>
+              </a:defRPr>
+            </a:lvl1pPr>
+          </a:lstStyle>
+          <a:p>
+            <a:pPr/>
+            <a:r>
+              <a:t>Prototype</a:t>
+            </a:r>
+          </a:p>
+        </p:txBody>
+      </p:sp>
+      <p:sp>
+        <p:nvSpPr>
+          <p:cNvPr id="224" name="Method"/>
+          <p:cNvSpPr/>
+          <p:nvPr/>
+        </p:nvSpPr>
+        <p:spPr>
+          <a:xfrm>
+            <a:off x="5359400" y="5060645"/>
+            <a:ext cx="1270001" cy="1270001"/>
+          </a:xfrm>
+          <a:prstGeom prst="roundRect">
+            <a:avLst>
+              <a:gd name="adj" fmla="val 15000"/>
+            </a:avLst>
+          </a:prstGeom>
+          <a:solidFill>
+            <a:schemeClr val="accent1"/>
+          </a:solidFill>
+          <a:ln w="12700">
+            <a:miter lim="400000"/>
+          </a:ln>
+          <a:extLst>
+            <a:ext uri="{C572A759-6A51-4108-AA02-DFA0A04FC94B}">
+              <ma14:wrappingTextBoxFlag xmlns:ma14="http://schemas.microsoft.com/office/mac/drawingml/2011/main" val="1"/>
+            </a:ext>
+          </a:extLst>
+        </p:spPr>
+        <p:txBody>
+          <a:bodyPr lIns="50800" tIns="50800" rIns="50800" bIns="50800" anchor="ctr"/>
+          <a:lstStyle>
+            <a:lvl1pPr algn="ctr">
+              <a:lnSpc>
+                <a:spcPct val="80000"/>
+              </a:lnSpc>
+              <a:spcBef>
+                <a:spcPts val="0"/>
+              </a:spcBef>
+              <a:defRPr cap="all" sz="2400">
+                <a:solidFill>
+                  <a:srgbClr val="FFFFFF"/>
+                </a:solidFill>
+                <a:latin typeface="+mn-lt"/>
+                <a:ea typeface="+mn-ea"/>
+                <a:cs typeface="+mn-cs"/>
+                <a:sym typeface="DIN Condensed"/>
+              </a:defRPr>
+            </a:lvl1pPr>
+          </a:lstStyle>
+          <a:p>
+            <a:pPr/>
+            <a:r>
+              <a:t>Method</a:t>
+            </a:r>
+          </a:p>
+        </p:txBody>
+      </p:sp>
+      <p:sp>
+        <p:nvSpPr>
+          <p:cNvPr id="225" name="Properties"/>
+          <p:cNvSpPr/>
+          <p:nvPr/>
+        </p:nvSpPr>
+        <p:spPr>
+          <a:xfrm>
+            <a:off x="7707949" y="5060645"/>
+            <a:ext cx="1270001" cy="1270001"/>
+          </a:xfrm>
+          <a:prstGeom prst="roundRect">
+            <a:avLst>
+              <a:gd name="adj" fmla="val 15000"/>
+            </a:avLst>
+          </a:prstGeom>
+          <a:solidFill>
+            <a:schemeClr val="accent1"/>
+          </a:solidFill>
+          <a:ln w="12700">
+            <a:miter lim="400000"/>
+          </a:ln>
+          <a:extLst>
+            <a:ext uri="{C572A759-6A51-4108-AA02-DFA0A04FC94B}">
+              <ma14:wrappingTextBoxFlag xmlns:ma14="http://schemas.microsoft.com/office/mac/drawingml/2011/main" val="1"/>
+            </a:ext>
+          </a:extLst>
+        </p:spPr>
+        <p:txBody>
+          <a:bodyPr lIns="50800" tIns="50800" rIns="50800" bIns="50800" anchor="ctr"/>
+          <a:lstStyle>
+            <a:lvl1pPr algn="ctr">
+              <a:lnSpc>
+                <a:spcPct val="80000"/>
+              </a:lnSpc>
+              <a:spcBef>
+                <a:spcPts val="0"/>
+              </a:spcBef>
+              <a:defRPr cap="all" sz="2400">
+                <a:solidFill>
+                  <a:srgbClr val="FFFFFF"/>
+                </a:solidFill>
+                <a:latin typeface="+mn-lt"/>
+                <a:ea typeface="+mn-ea"/>
+                <a:cs typeface="+mn-cs"/>
+                <a:sym typeface="DIN Condensed"/>
+              </a:defRPr>
+            </a:lvl1pPr>
+          </a:lstStyle>
+          <a:p>
+            <a:pPr/>
+            <a:r>
+              <a:t>Properties</a:t>
+            </a:r>
+          </a:p>
+        </p:txBody>
+      </p:sp>
+      <p:sp>
+        <p:nvSpPr>
+          <p:cNvPr id="226" name="Line"/>
+          <p:cNvSpPr/>
+          <p:nvPr/>
+        </p:nvSpPr>
+        <p:spPr>
+          <a:xfrm flipH="1">
+            <a:off x="2607373" y="4931065"/>
+            <a:ext cx="1" cy="1270001"/>
+          </a:xfrm>
+          <a:prstGeom prst="line">
+            <a:avLst/>
+          </a:prstGeom>
+          <a:ln w="25400">
+            <a:solidFill>
+              <a:schemeClr val="accent1"/>
+            </a:solidFill>
+            <a:miter lim="400000"/>
+            <a:tailEnd type="triangle"/>
+          </a:ln>
+        </p:spPr>
+        <p:txBody>
+          <a:bodyPr lIns="50800" tIns="50800" rIns="50800" bIns="50800" anchor="ctr"/>
+          <a:lstStyle/>
+          <a:p>
+            <a:pPr algn="ctr">
+              <a:lnSpc>
+                <a:spcPct val="80000"/>
+              </a:lnSpc>
+              <a:spcBef>
+                <a:spcPts val="0"/>
+              </a:spcBef>
+              <a:defRPr cap="all" sz="2800">
+                <a:latin typeface="+mn-lt"/>
+                <a:ea typeface="+mn-ea"/>
+                <a:cs typeface="+mn-cs"/>
+                <a:sym typeface="DIN Condensed"/>
+              </a:defRPr>
+            </a:pPr>
+          </a:p>
+        </p:txBody>
+      </p:sp>
+      <p:sp>
+        <p:nvSpPr>
+          <p:cNvPr id="227" name="Line"/>
+          <p:cNvSpPr/>
+          <p:nvPr/>
+        </p:nvSpPr>
+        <p:spPr>
+          <a:xfrm>
+            <a:off x="7694877" y="4569258"/>
+            <a:ext cx="693215" cy="446150"/>
+          </a:xfrm>
+          <a:prstGeom prst="line">
+            <a:avLst/>
+          </a:prstGeom>
+          <a:ln w="25400">
+            <a:solidFill>
+              <a:schemeClr val="accent1"/>
+            </a:solidFill>
+            <a:miter lim="400000"/>
+            <a:tailEnd type="triangle"/>
+          </a:ln>
+        </p:spPr>
+        <p:txBody>
+          <a:bodyPr lIns="50800" tIns="50800" rIns="50800" bIns="50800" anchor="ctr"/>
+          <a:lstStyle/>
+          <a:p>
+            <a:pPr algn="ctr">
+              <a:lnSpc>
+                <a:spcPct val="80000"/>
+              </a:lnSpc>
+              <a:spcBef>
+                <a:spcPts val="0"/>
+              </a:spcBef>
+              <a:defRPr cap="all" sz="2800">
+                <a:latin typeface="+mn-lt"/>
+                <a:ea typeface="+mn-ea"/>
+                <a:cs typeface="+mn-cs"/>
+                <a:sym typeface="DIN Condensed"/>
+              </a:defRPr>
+            </a:pPr>
+          </a:p>
+        </p:txBody>
+      </p:sp>
+      <p:sp>
+        <p:nvSpPr>
+          <p:cNvPr id="228" name="Object2"/>
+          <p:cNvSpPr/>
+          <p:nvPr/>
+        </p:nvSpPr>
+        <p:spPr>
+          <a:xfrm>
+            <a:off x="2023370" y="6188775"/>
+            <a:ext cx="1270001" cy="1270001"/>
+          </a:xfrm>
+          <a:prstGeom prst="rect">
+            <a:avLst/>
+          </a:prstGeom>
+          <a:solidFill>
+            <a:schemeClr val="accent1"/>
+          </a:solidFill>
+          <a:ln w="12700">
+            <a:miter lim="400000"/>
+          </a:ln>
+          <a:extLst>
+            <a:ext uri="{C572A759-6A51-4108-AA02-DFA0A04FC94B}">
+              <ma14:wrappingTextBoxFlag xmlns:ma14="http://schemas.microsoft.com/office/mac/drawingml/2011/main" val="1"/>
+            </a:ext>
+          </a:extLst>
+        </p:spPr>
+        <p:txBody>
+          <a:bodyPr lIns="50800" tIns="50800" rIns="50800" bIns="50800" anchor="ctr"/>
+          <a:lstStyle>
+            <a:lvl1pPr algn="ctr">
+              <a:lnSpc>
+                <a:spcPct val="80000"/>
+              </a:lnSpc>
+              <a:spcBef>
+                <a:spcPts val="0"/>
+              </a:spcBef>
+              <a:defRPr cap="all" sz="2800">
+                <a:solidFill>
+                  <a:srgbClr val="FFFFFF"/>
+                </a:solidFill>
+                <a:latin typeface="+mn-lt"/>
+                <a:ea typeface="+mn-ea"/>
+                <a:cs typeface="+mn-cs"/>
+                <a:sym typeface="DIN Condensed"/>
+              </a:defRPr>
+            </a:lvl1pPr>
+          </a:lstStyle>
+          <a:p>
+            <a:pPr/>
+            <a:r>
+              <a:t>Object2</a:t>
+            </a:r>
+          </a:p>
+        </p:txBody>
+      </p:sp>
+      <p:sp>
+        <p:nvSpPr>
+          <p:cNvPr id="229" name="Line"/>
+          <p:cNvSpPr/>
+          <p:nvPr/>
+        </p:nvSpPr>
+        <p:spPr>
+          <a:xfrm flipH="1">
+            <a:off x="6002047" y="4574960"/>
+            <a:ext cx="618719" cy="435234"/>
+          </a:xfrm>
+          <a:prstGeom prst="line">
+            <a:avLst/>
+          </a:prstGeom>
+          <a:ln w="25400">
+            <a:solidFill>
+              <a:schemeClr val="accent1"/>
+            </a:solidFill>
+            <a:miter lim="400000"/>
+            <a:tailEnd type="triangle"/>
+          </a:ln>
+        </p:spPr>
+        <p:txBody>
+          <a:bodyPr lIns="50800" tIns="50800" rIns="50800" bIns="50800" anchor="ctr"/>
+          <a:lstStyle/>
+          <a:p>
+            <a:pPr algn="ctr">
+              <a:lnSpc>
+                <a:spcPct val="80000"/>
+              </a:lnSpc>
+              <a:spcBef>
+                <a:spcPts val="0"/>
+              </a:spcBef>
+              <a:defRPr cap="all" sz="2800">
+                <a:latin typeface="+mn-lt"/>
+                <a:ea typeface="+mn-ea"/>
+                <a:cs typeface="+mn-cs"/>
+                <a:sym typeface="DIN Condensed"/>
+              </a:defRPr>
+            </a:pPr>
+          </a:p>
+        </p:txBody>
+      </p:sp>
+      <p:sp>
+        <p:nvSpPr>
+          <p:cNvPr id="230" name="Line"/>
+          <p:cNvSpPr/>
+          <p:nvPr/>
+        </p:nvSpPr>
+        <p:spPr>
+          <a:xfrm flipH="1">
+            <a:off x="3255392" y="5671661"/>
+            <a:ext cx="2064909" cy="1139529"/>
+          </a:xfrm>
+          <a:prstGeom prst="line">
+            <a:avLst/>
+          </a:prstGeom>
+          <a:ln w="25400">
+            <a:solidFill>
+              <a:schemeClr val="accent1"/>
+            </a:solidFill>
+            <a:miter lim="400000"/>
+            <a:tailEnd type="triangle"/>
+          </a:ln>
+        </p:spPr>
+        <p:txBody>
+          <a:bodyPr lIns="50800" tIns="50800" rIns="50800" bIns="50800" anchor="ctr"/>
+          <a:lstStyle/>
+          <a:p>
+            <a:pPr algn="ctr">
+              <a:lnSpc>
+                <a:spcPct val="80000"/>
+              </a:lnSpc>
+              <a:spcBef>
+                <a:spcPts val="0"/>
+              </a:spcBef>
+              <a:defRPr cap="all" sz="2800">
+                <a:latin typeface="+mn-lt"/>
+                <a:ea typeface="+mn-ea"/>
+                <a:cs typeface="+mn-cs"/>
+                <a:sym typeface="DIN Condensed"/>
+              </a:defRPr>
+            </a:pPr>
+          </a:p>
+        </p:txBody>
+      </p:sp>
+      <p:sp>
+        <p:nvSpPr>
+          <p:cNvPr id="231" name="Line"/>
+          <p:cNvSpPr/>
+          <p:nvPr/>
+        </p:nvSpPr>
+        <p:spPr>
+          <a:xfrm flipH="1">
+            <a:off x="3246471" y="6201218"/>
+            <a:ext cx="4547527" cy="896010"/>
+          </a:xfrm>
+          <a:prstGeom prst="line">
+            <a:avLst/>
+          </a:prstGeom>
+          <a:ln w="25400">
+            <a:solidFill>
+              <a:schemeClr val="accent1"/>
+            </a:solidFill>
+            <a:miter lim="400000"/>
+            <a:tailEnd type="triangle"/>
+          </a:ln>
+        </p:spPr>
+        <p:txBody>
+          <a:bodyPr lIns="50800" tIns="50800" rIns="50800" bIns="50800" anchor="ctr"/>
+          <a:lstStyle/>
+          <a:p>
+            <a:pPr algn="ctr">
+              <a:lnSpc>
+                <a:spcPct val="80000"/>
+              </a:lnSpc>
+              <a:spcBef>
+                <a:spcPts val="0"/>
+              </a:spcBef>
+              <a:defRPr cap="all" sz="2800">
+                <a:latin typeface="+mn-lt"/>
+                <a:ea typeface="+mn-ea"/>
+                <a:cs typeface="+mn-cs"/>
+                <a:sym typeface="DIN Condensed"/>
+              </a:defRPr>
+            </a:pPr>
+          </a:p>
+        </p:txBody>
+      </p:sp>
+      <p:sp>
+        <p:nvSpPr>
+          <p:cNvPr id="232" name="Line"/>
+          <p:cNvSpPr/>
+          <p:nvPr/>
+        </p:nvSpPr>
+        <p:spPr>
+          <a:xfrm>
+            <a:off x="3335646" y="4163961"/>
+            <a:ext cx="3282395" cy="1"/>
+          </a:xfrm>
+          <a:prstGeom prst="line">
+            <a:avLst/>
+          </a:prstGeom>
+          <a:ln w="25400">
+            <a:solidFill>
+              <a:schemeClr val="accent1"/>
+            </a:solidFill>
+            <a:miter lim="400000"/>
+            <a:tailEnd type="triangle"/>
+          </a:ln>
+        </p:spPr>
+        <p:txBody>
+          <a:bodyPr lIns="50800" tIns="50800" rIns="50800" bIns="50800" anchor="ctr"/>
+          <a:lstStyle/>
+          <a:p>
+            <a:pPr algn="ctr">
+              <a:lnSpc>
+                <a:spcPct val="80000"/>
+              </a:lnSpc>
+              <a:spcBef>
+                <a:spcPts val="0"/>
+              </a:spcBef>
+              <a:defRPr cap="all" sz="2800">
+                <a:latin typeface="+mn-lt"/>
+                <a:ea typeface="+mn-ea"/>
+                <a:cs typeface="+mn-cs"/>
+                <a:sym typeface="DIN Condensed"/>
+              </a:defRPr>
+            </a:pPr>
+          </a:p>
+        </p:txBody>
+      </p:sp>
+    </p:spTree>
+  </p:cSld>
+  <p:clrMapOvr>
+    <a:masterClrMapping/>
+  </p:clrMapOvr>
+  <p:transition xmlns:p14="http://schemas.microsoft.com/office/powerpoint/2010/main" spd="med" advClick="1"/>
+</p:sld>
+</file>
+
+<file path=ppt/slides/slide13.xml><?xml version="1.0" encoding="utf-8"?>
+<p:sld xmlns:a="http://schemas.openxmlformats.org/drawingml/2006/main" xmlns:r="http://schemas.openxmlformats.org/officeDocument/2006/relationships" xmlns:p="http://schemas.openxmlformats.org/presentationml/2006/main" showMasterSp="1" showMasterPhAnim="1">
+  <p:cSld>
+    <p:spTree>
+      <p:nvGrpSpPr>
+        <p:cNvPr id="1" name=""/>
+        <p:cNvGrpSpPr/>
+        <p:nvPr/>
+      </p:nvGrpSpPr>
+      <p:grpSpPr>
+        <a:xfrm>
+          <a:off x="0" y="0"/>
+          <a:ext cx="0" cy="0"/>
+          <a:chOff x="0" y="0"/>
+          <a:chExt cx="0" cy="0"/>
+        </a:xfrm>
+      </p:grpSpPr>
+      <p:sp>
+        <p:nvSpPr>
+          <p:cNvPr id="234" name="Javascript"/>
+          <p:cNvSpPr txBox="1"/>
+          <p:nvPr>
+            <p:ph type="body" idx="13"/>
+          </p:nvPr>
+        </p:nvSpPr>
+        <p:spPr>
+          <a:prstGeom prst="rect">
+            <a:avLst/>
+          </a:prstGeom>
+        </p:spPr>
+        <p:txBody>
+          <a:bodyPr/>
+          <a:lstStyle/>
+          <a:p>
+            <a:pPr/>
+            <a:r>
+              <a:t>Javascript</a:t>
+            </a:r>
+          </a:p>
+        </p:txBody>
+      </p:sp>
+      <p:sp>
+        <p:nvSpPr>
+          <p:cNvPr id="235" name="Prototype continue…."/>
+          <p:cNvSpPr txBox="1"/>
+          <p:nvPr>
+            <p:ph type="title"/>
+          </p:nvPr>
+        </p:nvSpPr>
+        <p:spPr>
+          <a:prstGeom prst="rect">
+            <a:avLst/>
+          </a:prstGeom>
+        </p:spPr>
+        <p:txBody>
+          <a:bodyPr/>
+          <a:lstStyle>
+            <a:lvl1pPr defTabSz="467359">
+              <a:spcBef>
+                <a:spcPts val="2200"/>
+              </a:spcBef>
+              <a:defRPr sz="4800"/>
+            </a:lvl1pPr>
+          </a:lstStyle>
+          <a:p>
+            <a:pPr/>
+            <a:r>
+              <a:t>Prototype continue….</a:t>
+            </a:r>
+          </a:p>
+        </p:txBody>
+      </p:sp>
+      <p:sp>
+        <p:nvSpPr>
+          <p:cNvPr id="236" name="Constructor… javaScript has no class based implementation…"/>
+          <p:cNvSpPr txBox="1"/>
+          <p:nvPr>
+            <p:ph type="body" idx="1"/>
+          </p:nvPr>
+        </p:nvSpPr>
+        <p:spPr>
+          <a:prstGeom prst="rect">
+            <a:avLst/>
+          </a:prstGeom>
+        </p:spPr>
+        <p:txBody>
+          <a:bodyPr/>
+          <a:lstStyle/>
+          <a:p>
+            <a:pPr/>
+            <a:r>
+              <a:t>Constructor… javaScript has no class based implementation</a:t>
+            </a:r>
+          </a:p>
+          <a:p>
+            <a:pPr/>
+            <a:r>
+              <a:t>JavaScript has a Prototype based Inheritance</a:t>
+            </a:r>
+          </a:p>
+          <a:p>
+            <a:pPr/>
+            <a:r>
+              <a:t>Unlike java (where you create class and object) in javascript you create constructor, using this constructor you can create objects.</a:t>
+            </a:r>
+          </a:p>
+          <a:p>
+            <a:pPr/>
+            <a:r>
+              <a:t>Example…</a:t>
+            </a:r>
+          </a:p>
+        </p:txBody>
+      </p:sp>
+    </p:spTree>
+  </p:cSld>
+  <p:clrMapOvr>
+    <a:masterClrMapping/>
+  </p:clrMapOvr>
+  <p:transition xmlns:p14="http://schemas.microsoft.com/office/powerpoint/2010/main" spd="med" advClick="1"/>
+</p:sld>
+</file>
+
+<file path=ppt/slides/slide14.xml><?xml version="1.0" encoding="utf-8"?>
+<p:sld xmlns:a="http://schemas.openxmlformats.org/drawingml/2006/main" xmlns:r="http://schemas.openxmlformats.org/officeDocument/2006/relationships" xmlns:p="http://schemas.openxmlformats.org/presentationml/2006/main" showMasterSp="1" showMasterPhAnim="1">
+  <p:cSld>
+    <p:spTree>
+      <p:nvGrpSpPr>
+        <p:cNvPr id="1" name=""/>
+        <p:cNvGrpSpPr/>
+        <p:nvPr/>
+      </p:nvGrpSpPr>
+      <p:grpSpPr>
+        <a:xfrm>
+          <a:off x="0" y="0"/>
+          <a:ext cx="0" cy="0"/>
+          <a:chOff x="0" y="0"/>
+          <a:chExt cx="0" cy="0"/>
+        </a:xfrm>
+      </p:grpSpPr>
+      <p:sp>
+        <p:nvSpPr>
+          <p:cNvPr id="238" name="Javascript"/>
+          <p:cNvSpPr txBox="1"/>
+          <p:nvPr>
+            <p:ph type="body" idx="13"/>
+          </p:nvPr>
+        </p:nvSpPr>
+        <p:spPr>
+          <a:prstGeom prst="rect">
+            <a:avLst/>
+          </a:prstGeom>
+        </p:spPr>
+        <p:txBody>
+          <a:bodyPr/>
+          <a:lstStyle/>
+          <a:p>
+            <a:pPr/>
+            <a:r>
+              <a:t>Javascript</a:t>
+            </a:r>
+          </a:p>
+        </p:txBody>
+      </p:sp>
+      <p:sp>
+        <p:nvSpPr>
+          <p:cNvPr id="239" name="Prototype continue…"/>
+          <p:cNvSpPr txBox="1"/>
+          <p:nvPr>
+            <p:ph type="title"/>
+          </p:nvPr>
+        </p:nvSpPr>
+        <p:spPr>
+          <a:prstGeom prst="rect">
+            <a:avLst/>
+          </a:prstGeom>
+        </p:spPr>
+        <p:txBody>
+          <a:bodyPr/>
+          <a:lstStyle>
+            <a:lvl1pPr defTabSz="467359">
+              <a:spcBef>
+                <a:spcPts val="2200"/>
+              </a:spcBef>
+              <a:defRPr sz="4800"/>
+            </a:lvl1pPr>
+          </a:lstStyle>
+          <a:p>
+            <a:pPr/>
+            <a:r>
+              <a:t>Prototype continue…</a:t>
+            </a:r>
+          </a:p>
+        </p:txBody>
+      </p:sp>
+      <p:sp>
+        <p:nvSpPr>
+          <p:cNvPr id="240" name="Master Objects"/>
+          <p:cNvSpPr txBox="1"/>
+          <p:nvPr>
+            <p:ph type="body" idx="1"/>
+          </p:nvPr>
+        </p:nvSpPr>
+        <p:spPr>
+          <a:prstGeom prst="rect">
+            <a:avLst/>
+          </a:prstGeom>
+        </p:spPr>
+        <p:txBody>
+          <a:bodyPr/>
+          <a:lstStyle/>
+          <a:p>
+            <a:pPr/>
+            <a:r>
+              <a:t>Master Objects</a:t>
+            </a:r>
+          </a:p>
+        </p:txBody>
+      </p:sp>
+      <p:sp>
+        <p:nvSpPr>
+          <p:cNvPr id="241" name="Object"/>
+          <p:cNvSpPr/>
+          <p:nvPr/>
+        </p:nvSpPr>
+        <p:spPr>
+          <a:xfrm>
+            <a:off x="5730113" y="2882899"/>
+            <a:ext cx="1270001" cy="1270001"/>
+          </a:xfrm>
+          <a:prstGeom prst="ellipse">
+            <a:avLst/>
+          </a:prstGeom>
+          <a:solidFill>
+            <a:schemeClr val="accent1"/>
+          </a:solidFill>
+          <a:ln w="12700">
+            <a:miter lim="400000"/>
+          </a:ln>
+          <a:extLst>
+            <a:ext uri="{C572A759-6A51-4108-AA02-DFA0A04FC94B}">
+              <ma14:wrappingTextBoxFlag xmlns:ma14="http://schemas.microsoft.com/office/mac/drawingml/2011/main" val="1"/>
+            </a:ext>
+          </a:extLst>
+        </p:spPr>
+        <p:txBody>
+          <a:bodyPr lIns="50800" tIns="50800" rIns="50800" bIns="50800" anchor="ctr"/>
+          <a:lstStyle>
+            <a:lvl1pPr algn="ctr">
+              <a:lnSpc>
+                <a:spcPct val="80000"/>
+              </a:lnSpc>
+              <a:spcBef>
+                <a:spcPts val="0"/>
+              </a:spcBef>
+              <a:defRPr cap="all" sz="2800">
+                <a:solidFill>
+                  <a:srgbClr val="FFFFFF"/>
+                </a:solidFill>
+                <a:latin typeface="+mn-lt"/>
+                <a:ea typeface="+mn-ea"/>
+                <a:cs typeface="+mn-cs"/>
+                <a:sym typeface="DIN Condensed"/>
+              </a:defRPr>
+            </a:lvl1pPr>
+          </a:lstStyle>
+          <a:p>
+            <a:pPr/>
+            <a:r>
+              <a:t>Object</a:t>
+            </a:r>
+          </a:p>
+        </p:txBody>
+      </p:sp>
+      <p:sp>
+        <p:nvSpPr>
+          <p:cNvPr id="242" name="Function"/>
+          <p:cNvSpPr/>
+          <p:nvPr/>
+        </p:nvSpPr>
+        <p:spPr>
+          <a:xfrm>
+            <a:off x="5359399" y="4775199"/>
+            <a:ext cx="2011428" cy="1270001"/>
+          </a:xfrm>
+          <a:prstGeom prst="roundRect">
+            <a:avLst>
+              <a:gd name="adj" fmla="val 15000"/>
+            </a:avLst>
+          </a:prstGeom>
+          <a:solidFill>
+            <a:schemeClr val="accent1"/>
+          </a:solidFill>
+          <a:ln w="12700">
+            <a:miter lim="400000"/>
+          </a:ln>
+          <a:extLst>
+            <a:ext uri="{C572A759-6A51-4108-AA02-DFA0A04FC94B}">
+              <ma14:wrappingTextBoxFlag xmlns:ma14="http://schemas.microsoft.com/office/mac/drawingml/2011/main" val="1"/>
+            </a:ext>
+          </a:extLst>
+        </p:spPr>
+        <p:txBody>
+          <a:bodyPr lIns="50800" tIns="50800" rIns="50800" bIns="50800" anchor="ctr"/>
+          <a:lstStyle>
+            <a:lvl1pPr algn="ctr">
+              <a:lnSpc>
+                <a:spcPct val="80000"/>
+              </a:lnSpc>
+              <a:spcBef>
+                <a:spcPts val="0"/>
+              </a:spcBef>
+              <a:defRPr cap="all" sz="2800">
+                <a:solidFill>
+                  <a:srgbClr val="FFFFFF"/>
+                </a:solidFill>
+                <a:latin typeface="+mn-lt"/>
+                <a:ea typeface="+mn-ea"/>
+                <a:cs typeface="+mn-cs"/>
+                <a:sym typeface="DIN Condensed"/>
+              </a:defRPr>
+            </a:lvl1pPr>
+          </a:lstStyle>
+          <a:p>
+            <a:pPr/>
+            <a:r>
+              <a:t>Function</a:t>
+            </a:r>
+          </a:p>
+        </p:txBody>
+      </p:sp>
+      <p:sp>
+        <p:nvSpPr>
+          <p:cNvPr id="243" name="x"/>
+          <p:cNvSpPr/>
+          <p:nvPr/>
+        </p:nvSpPr>
+        <p:spPr>
+          <a:xfrm>
+            <a:off x="5278373" y="6812806"/>
+            <a:ext cx="2173480" cy="1270001"/>
+          </a:xfrm>
+          <a:prstGeom prst="rect">
+            <a:avLst/>
+          </a:prstGeom>
+          <a:solidFill>
+            <a:schemeClr val="accent1"/>
+          </a:solidFill>
+          <a:ln w="12700">
+            <a:miter lim="400000"/>
+          </a:ln>
+          <a:extLst>
+            <a:ext uri="{C572A759-6A51-4108-AA02-DFA0A04FC94B}">
+              <ma14:wrappingTextBoxFlag xmlns:ma14="http://schemas.microsoft.com/office/mac/drawingml/2011/main" val="1"/>
+            </a:ext>
+          </a:extLst>
+        </p:spPr>
+        <p:txBody>
+          <a:bodyPr lIns="50800" tIns="50800" rIns="50800" bIns="50800" anchor="ctr"/>
+          <a:lstStyle>
+            <a:lvl1pPr algn="ctr">
+              <a:lnSpc>
+                <a:spcPct val="80000"/>
+              </a:lnSpc>
+              <a:spcBef>
+                <a:spcPts val="0"/>
+              </a:spcBef>
+              <a:defRPr cap="all" sz="2800">
+                <a:solidFill>
+                  <a:srgbClr val="FFFFFF"/>
+                </a:solidFill>
+                <a:latin typeface="+mn-lt"/>
+                <a:ea typeface="+mn-ea"/>
+                <a:cs typeface="+mn-cs"/>
+                <a:sym typeface="DIN Condensed"/>
+              </a:defRPr>
+            </a:lvl1pPr>
+          </a:lstStyle>
+          <a:p>
+            <a:pPr/>
+            <a:r>
+              <a:t>x</a:t>
+            </a:r>
+          </a:p>
+        </p:txBody>
+      </p:sp>
+      <p:sp>
+        <p:nvSpPr>
+          <p:cNvPr id="244" name="Line"/>
+          <p:cNvSpPr/>
+          <p:nvPr/>
+        </p:nvSpPr>
+        <p:spPr>
+          <a:xfrm>
+            <a:off x="6411428" y="4116311"/>
+            <a:ext cx="1" cy="723901"/>
+          </a:xfrm>
+          <a:prstGeom prst="line">
+            <a:avLst/>
+          </a:prstGeom>
+          <a:ln w="25400">
+            <a:solidFill>
+              <a:schemeClr val="accent1"/>
+            </a:solidFill>
+            <a:miter lim="400000"/>
+            <a:tailEnd type="triangle"/>
+          </a:ln>
+        </p:spPr>
+        <p:txBody>
+          <a:bodyPr lIns="50800" tIns="50800" rIns="50800" bIns="50800" anchor="ctr"/>
+          <a:lstStyle/>
+          <a:p>
+            <a:pPr algn="ctr">
+              <a:lnSpc>
+                <a:spcPct val="80000"/>
+              </a:lnSpc>
+              <a:spcBef>
+                <a:spcPts val="0"/>
+              </a:spcBef>
+              <a:defRPr cap="all" sz="2800">
+                <a:latin typeface="+mn-lt"/>
+                <a:ea typeface="+mn-ea"/>
+                <a:cs typeface="+mn-cs"/>
+                <a:sym typeface="DIN Condensed"/>
+              </a:defRPr>
+            </a:pPr>
+          </a:p>
+        </p:txBody>
+      </p:sp>
+      <p:sp>
+        <p:nvSpPr>
+          <p:cNvPr id="245" name="Line"/>
+          <p:cNvSpPr/>
+          <p:nvPr/>
+        </p:nvSpPr>
+        <p:spPr>
+          <a:xfrm>
+            <a:off x="6411428" y="6067053"/>
+            <a:ext cx="1" cy="723901"/>
+          </a:xfrm>
+          <a:prstGeom prst="line">
+            <a:avLst/>
+          </a:prstGeom>
+          <a:ln w="25400">
+            <a:solidFill>
+              <a:schemeClr val="accent1"/>
+            </a:solidFill>
+            <a:miter lim="400000"/>
+            <a:tailEnd type="triangle"/>
+          </a:ln>
+        </p:spPr>
+        <p:txBody>
+          <a:bodyPr lIns="50800" tIns="50800" rIns="50800" bIns="50800" anchor="ctr"/>
+          <a:lstStyle/>
+          <a:p>
+            <a:pPr algn="ctr">
+              <a:lnSpc>
+                <a:spcPct val="80000"/>
+              </a:lnSpc>
+              <a:spcBef>
+                <a:spcPts val="0"/>
+              </a:spcBef>
+              <a:defRPr cap="all" sz="2800">
+                <a:latin typeface="+mn-lt"/>
+                <a:ea typeface="+mn-ea"/>
+                <a:cs typeface="+mn-cs"/>
+                <a:sym typeface="DIN Condensed"/>
+              </a:defRPr>
+            </a:pPr>
+          </a:p>
+        </p:txBody>
+      </p:sp>
+      <p:sp>
+        <p:nvSpPr>
+          <p:cNvPr id="246" name="prototype"/>
+          <p:cNvSpPr/>
+          <p:nvPr/>
+        </p:nvSpPr>
+        <p:spPr>
+          <a:xfrm>
+            <a:off x="9106680" y="2918177"/>
+            <a:ext cx="1270001" cy="457201"/>
+          </a:xfrm>
+          <a:prstGeom prst="rect">
+            <a:avLst/>
+          </a:prstGeom>
+          <a:solidFill>
+            <a:schemeClr val="accent1"/>
+          </a:solidFill>
+          <a:ln w="12700">
+            <a:miter lim="400000"/>
+          </a:ln>
+          <a:extLst>
+            <a:ext uri="{C572A759-6A51-4108-AA02-DFA0A04FC94B}">
+              <ma14:wrappingTextBoxFlag xmlns:ma14="http://schemas.microsoft.com/office/mac/drawingml/2011/main" val="1"/>
+            </a:ext>
+          </a:extLst>
+        </p:spPr>
+        <p:txBody>
+          <a:bodyPr lIns="50800" tIns="50800" rIns="50800" bIns="50800" anchor="ctr"/>
+          <a:lstStyle>
+            <a:lvl1pPr algn="ctr">
+              <a:lnSpc>
+                <a:spcPct val="80000"/>
+              </a:lnSpc>
+              <a:spcBef>
+                <a:spcPts val="0"/>
+              </a:spcBef>
+              <a:defRPr cap="all" sz="2400">
+                <a:solidFill>
+                  <a:srgbClr val="FFFFFF"/>
+                </a:solidFill>
+                <a:latin typeface="+mn-lt"/>
+                <a:ea typeface="+mn-ea"/>
+                <a:cs typeface="+mn-cs"/>
+                <a:sym typeface="DIN Condensed"/>
+              </a:defRPr>
+            </a:lvl1pPr>
+          </a:lstStyle>
+          <a:p>
+            <a:pPr/>
+            <a:r>
+              <a:t>prototype</a:t>
+            </a:r>
+          </a:p>
+        </p:txBody>
+      </p:sp>
+      <p:sp>
+        <p:nvSpPr>
+          <p:cNvPr id="247" name="Method"/>
+          <p:cNvSpPr/>
+          <p:nvPr/>
+        </p:nvSpPr>
+        <p:spPr>
+          <a:xfrm>
+            <a:off x="8140700" y="3614661"/>
+            <a:ext cx="1510705" cy="457201"/>
+          </a:xfrm>
+          <a:prstGeom prst="roundRect">
+            <a:avLst>
+              <a:gd name="adj" fmla="val 41667"/>
+            </a:avLst>
+          </a:prstGeom>
+          <a:solidFill>
+            <a:schemeClr val="accent1"/>
+          </a:solidFill>
+          <a:ln w="12700">
+            <a:miter lim="400000"/>
+          </a:ln>
+          <a:extLst>
+            <a:ext uri="{C572A759-6A51-4108-AA02-DFA0A04FC94B}">
+              <ma14:wrappingTextBoxFlag xmlns:ma14="http://schemas.microsoft.com/office/mac/drawingml/2011/main" val="1"/>
+            </a:ext>
+          </a:extLst>
+        </p:spPr>
+        <p:txBody>
+          <a:bodyPr lIns="50800" tIns="50800" rIns="50800" bIns="50800" anchor="ctr"/>
+          <a:lstStyle>
+            <a:lvl1pPr algn="ctr">
+              <a:lnSpc>
+                <a:spcPct val="80000"/>
+              </a:lnSpc>
+              <a:spcBef>
+                <a:spcPts val="0"/>
+              </a:spcBef>
+              <a:defRPr cap="all" sz="2200">
+                <a:solidFill>
+                  <a:srgbClr val="FFFFFF"/>
+                </a:solidFill>
+                <a:latin typeface="+mn-lt"/>
+                <a:ea typeface="+mn-ea"/>
+                <a:cs typeface="+mn-cs"/>
+                <a:sym typeface="DIN Condensed"/>
+              </a:defRPr>
+            </a:lvl1pPr>
+          </a:lstStyle>
+          <a:p>
+            <a:pPr/>
+            <a:r>
+              <a:t>Method</a:t>
+            </a:r>
+          </a:p>
+        </p:txBody>
+      </p:sp>
+      <p:sp>
+        <p:nvSpPr>
+          <p:cNvPr id="248" name="properties"/>
+          <p:cNvSpPr/>
+          <p:nvPr/>
+        </p:nvSpPr>
+        <p:spPr>
+          <a:xfrm>
+            <a:off x="10147299" y="3614661"/>
+            <a:ext cx="1510706" cy="457201"/>
+          </a:xfrm>
+          <a:prstGeom prst="roundRect">
+            <a:avLst>
+              <a:gd name="adj" fmla="val 41667"/>
+            </a:avLst>
+          </a:prstGeom>
+          <a:solidFill>
+            <a:schemeClr val="accent1"/>
+          </a:solidFill>
+          <a:ln w="12700">
+            <a:miter lim="400000"/>
+          </a:ln>
+          <a:extLst>
+            <a:ext uri="{C572A759-6A51-4108-AA02-DFA0A04FC94B}">
+              <ma14:wrappingTextBoxFlag xmlns:ma14="http://schemas.microsoft.com/office/mac/drawingml/2011/main" val="1"/>
+            </a:ext>
+          </a:extLst>
+        </p:spPr>
+        <p:txBody>
+          <a:bodyPr lIns="50800" tIns="50800" rIns="50800" bIns="50800" anchor="ctr"/>
+          <a:lstStyle>
+            <a:lvl1pPr algn="ctr">
+              <a:lnSpc>
+                <a:spcPct val="80000"/>
+              </a:lnSpc>
+              <a:spcBef>
+                <a:spcPts val="0"/>
+              </a:spcBef>
+              <a:defRPr cap="all" sz="2200">
+                <a:solidFill>
+                  <a:srgbClr val="FFFFFF"/>
+                </a:solidFill>
+                <a:latin typeface="+mn-lt"/>
+                <a:ea typeface="+mn-ea"/>
+                <a:cs typeface="+mn-cs"/>
+                <a:sym typeface="DIN Condensed"/>
+              </a:defRPr>
+            </a:lvl1pPr>
+          </a:lstStyle>
+          <a:p>
+            <a:pPr/>
+            <a:r>
+              <a:t>properties</a:t>
+            </a:r>
+          </a:p>
+        </p:txBody>
+      </p:sp>
+      <p:sp>
+        <p:nvSpPr>
+          <p:cNvPr id="249" name="Line"/>
+          <p:cNvSpPr/>
+          <p:nvPr/>
+        </p:nvSpPr>
+        <p:spPr>
+          <a:xfrm flipV="1">
+            <a:off x="9080499" y="3378200"/>
+            <a:ext cx="279401" cy="279401"/>
+          </a:xfrm>
+          <a:prstGeom prst="line">
+            <a:avLst/>
+          </a:prstGeom>
+          <a:ln w="25400">
+            <a:solidFill>
+              <a:schemeClr val="accent1"/>
+            </a:solidFill>
+            <a:miter lim="400000"/>
+          </a:ln>
+        </p:spPr>
+        <p:txBody>
+          <a:bodyPr lIns="50800" tIns="50800" rIns="50800" bIns="50800" anchor="ctr"/>
+          <a:lstStyle/>
+          <a:p>
+            <a:pPr algn="ctr">
+              <a:lnSpc>
+                <a:spcPct val="80000"/>
+              </a:lnSpc>
+              <a:spcBef>
+                <a:spcPts val="0"/>
+              </a:spcBef>
+              <a:defRPr cap="all" sz="2800">
+                <a:latin typeface="+mn-lt"/>
+                <a:ea typeface="+mn-ea"/>
+                <a:cs typeface="+mn-cs"/>
+                <a:sym typeface="DIN Condensed"/>
+              </a:defRPr>
+            </a:pPr>
+          </a:p>
+        </p:txBody>
+      </p:sp>
+      <p:sp>
+        <p:nvSpPr>
+          <p:cNvPr id="250" name="Line"/>
+          <p:cNvSpPr/>
+          <p:nvPr/>
+        </p:nvSpPr>
+        <p:spPr>
+          <a:xfrm flipH="1" flipV="1">
+            <a:off x="10085437" y="3350362"/>
+            <a:ext cx="385267" cy="280729"/>
+          </a:xfrm>
+          <a:prstGeom prst="line">
+            <a:avLst/>
+          </a:prstGeom>
+          <a:ln w="25400">
+            <a:solidFill>
+              <a:schemeClr val="accent1"/>
+            </a:solidFill>
+            <a:miter lim="400000"/>
+          </a:ln>
+        </p:spPr>
+        <p:txBody>
+          <a:bodyPr lIns="50800" tIns="50800" rIns="50800" bIns="50800" anchor="ctr"/>
+          <a:lstStyle/>
+          <a:p>
+            <a:pPr algn="ctr">
+              <a:lnSpc>
+                <a:spcPct val="80000"/>
+              </a:lnSpc>
+              <a:spcBef>
+                <a:spcPts val="0"/>
+              </a:spcBef>
+              <a:defRPr cap="all" sz="2800">
+                <a:latin typeface="+mn-lt"/>
+                <a:ea typeface="+mn-ea"/>
+                <a:cs typeface="+mn-cs"/>
+                <a:sym typeface="DIN Condensed"/>
+              </a:defRPr>
+            </a:pPr>
+          </a:p>
+        </p:txBody>
+      </p:sp>
+      <p:sp>
+        <p:nvSpPr>
+          <p:cNvPr id="251" name="Line"/>
+          <p:cNvSpPr/>
+          <p:nvPr/>
+        </p:nvSpPr>
+        <p:spPr>
+          <a:xfrm>
+            <a:off x="6881620" y="3203771"/>
+            <a:ext cx="2173480" cy="1"/>
+          </a:xfrm>
+          <a:prstGeom prst="line">
+            <a:avLst/>
+          </a:prstGeom>
+          <a:ln w="25400">
+            <a:solidFill>
+              <a:schemeClr val="accent1"/>
+            </a:solidFill>
+            <a:miter lim="400000"/>
+            <a:tailEnd type="triangle"/>
+          </a:ln>
+        </p:spPr>
+        <p:txBody>
+          <a:bodyPr lIns="50800" tIns="50800" rIns="50800" bIns="50800" anchor="ctr"/>
+          <a:lstStyle/>
+          <a:p>
+            <a:pPr algn="ctr">
+              <a:lnSpc>
+                <a:spcPct val="80000"/>
+              </a:lnSpc>
+              <a:spcBef>
+                <a:spcPts val="0"/>
+              </a:spcBef>
+              <a:defRPr cap="all" sz="2800">
+                <a:latin typeface="+mn-lt"/>
+                <a:ea typeface="+mn-ea"/>
+                <a:cs typeface="+mn-cs"/>
+                <a:sym typeface="DIN Condensed"/>
+              </a:defRPr>
+            </a:pPr>
+          </a:p>
+        </p:txBody>
+      </p:sp>
+      <p:sp>
+        <p:nvSpPr>
+          <p:cNvPr id="252" name="prototype"/>
+          <p:cNvSpPr/>
+          <p:nvPr/>
+        </p:nvSpPr>
+        <p:spPr>
+          <a:xfrm>
+            <a:off x="9106679" y="4721577"/>
+            <a:ext cx="1270001" cy="457201"/>
+          </a:xfrm>
+          <a:prstGeom prst="rect">
+            <a:avLst/>
+          </a:prstGeom>
+          <a:solidFill>
+            <a:schemeClr val="accent1"/>
+          </a:solidFill>
+          <a:ln w="12700">
+            <a:miter lim="400000"/>
+          </a:ln>
+          <a:extLst>
+            <a:ext uri="{C572A759-6A51-4108-AA02-DFA0A04FC94B}">
+              <ma14:wrappingTextBoxFlag xmlns:ma14="http://schemas.microsoft.com/office/mac/drawingml/2011/main" val="1"/>
+            </a:ext>
+          </a:extLst>
+        </p:spPr>
+        <p:txBody>
+          <a:bodyPr lIns="50800" tIns="50800" rIns="50800" bIns="50800" anchor="ctr"/>
+          <a:lstStyle>
+            <a:lvl1pPr algn="ctr">
+              <a:lnSpc>
+                <a:spcPct val="80000"/>
+              </a:lnSpc>
+              <a:spcBef>
+                <a:spcPts val="0"/>
+              </a:spcBef>
+              <a:defRPr cap="all" sz="2400">
+                <a:solidFill>
+                  <a:srgbClr val="FFFFFF"/>
+                </a:solidFill>
+                <a:latin typeface="+mn-lt"/>
+                <a:ea typeface="+mn-ea"/>
+                <a:cs typeface="+mn-cs"/>
+                <a:sym typeface="DIN Condensed"/>
+              </a:defRPr>
+            </a:lvl1pPr>
+          </a:lstStyle>
+          <a:p>
+            <a:pPr/>
+            <a:r>
+              <a:t>prototype</a:t>
+            </a:r>
+          </a:p>
+        </p:txBody>
+      </p:sp>
+      <p:sp>
+        <p:nvSpPr>
+          <p:cNvPr id="253" name="Method"/>
+          <p:cNvSpPr/>
+          <p:nvPr/>
+        </p:nvSpPr>
+        <p:spPr>
+          <a:xfrm>
+            <a:off x="8140700" y="5418061"/>
+            <a:ext cx="1510705" cy="457201"/>
+          </a:xfrm>
+          <a:prstGeom prst="roundRect">
+            <a:avLst>
+              <a:gd name="adj" fmla="val 41667"/>
+            </a:avLst>
+          </a:prstGeom>
+          <a:solidFill>
+            <a:schemeClr val="accent1"/>
+          </a:solidFill>
+          <a:ln w="12700">
+            <a:miter lim="400000"/>
+          </a:ln>
+          <a:extLst>
+            <a:ext uri="{C572A759-6A51-4108-AA02-DFA0A04FC94B}">
+              <ma14:wrappingTextBoxFlag xmlns:ma14="http://schemas.microsoft.com/office/mac/drawingml/2011/main" val="1"/>
+            </a:ext>
+          </a:extLst>
+        </p:spPr>
+        <p:txBody>
+          <a:bodyPr lIns="50800" tIns="50800" rIns="50800" bIns="50800" anchor="ctr"/>
+          <a:lstStyle>
+            <a:lvl1pPr algn="ctr">
+              <a:lnSpc>
+                <a:spcPct val="80000"/>
+              </a:lnSpc>
+              <a:spcBef>
+                <a:spcPts val="0"/>
+              </a:spcBef>
+              <a:defRPr cap="all" sz="2200">
+                <a:solidFill>
+                  <a:srgbClr val="FFFFFF"/>
+                </a:solidFill>
+                <a:latin typeface="+mn-lt"/>
+                <a:ea typeface="+mn-ea"/>
+                <a:cs typeface="+mn-cs"/>
+                <a:sym typeface="DIN Condensed"/>
+              </a:defRPr>
+            </a:lvl1pPr>
+          </a:lstStyle>
+          <a:p>
+            <a:pPr/>
+            <a:r>
+              <a:t>Method</a:t>
+            </a:r>
+          </a:p>
+        </p:txBody>
+      </p:sp>
+      <p:sp>
+        <p:nvSpPr>
+          <p:cNvPr id="254" name="properties"/>
+          <p:cNvSpPr/>
+          <p:nvPr/>
+        </p:nvSpPr>
+        <p:spPr>
+          <a:xfrm>
+            <a:off x="10147300" y="5418061"/>
+            <a:ext cx="1510705" cy="457201"/>
+          </a:xfrm>
+          <a:prstGeom prst="roundRect">
+            <a:avLst>
+              <a:gd name="adj" fmla="val 41667"/>
+            </a:avLst>
+          </a:prstGeom>
+          <a:solidFill>
+            <a:schemeClr val="accent1"/>
+          </a:solidFill>
+          <a:ln w="12700">
+            <a:miter lim="400000"/>
+          </a:ln>
+          <a:extLst>
+            <a:ext uri="{C572A759-6A51-4108-AA02-DFA0A04FC94B}">
+              <ma14:wrappingTextBoxFlag xmlns:ma14="http://schemas.microsoft.com/office/mac/drawingml/2011/main" val="1"/>
+            </a:ext>
+          </a:extLst>
+        </p:spPr>
+        <p:txBody>
+          <a:bodyPr lIns="50800" tIns="50800" rIns="50800" bIns="50800" anchor="ctr"/>
+          <a:lstStyle>
+            <a:lvl1pPr algn="ctr">
+              <a:lnSpc>
+                <a:spcPct val="80000"/>
+              </a:lnSpc>
+              <a:spcBef>
+                <a:spcPts val="0"/>
+              </a:spcBef>
+              <a:defRPr cap="all" sz="2200">
+                <a:solidFill>
+                  <a:srgbClr val="FFFFFF"/>
+                </a:solidFill>
+                <a:latin typeface="+mn-lt"/>
+                <a:ea typeface="+mn-ea"/>
+                <a:cs typeface="+mn-cs"/>
+                <a:sym typeface="DIN Condensed"/>
+              </a:defRPr>
+            </a:lvl1pPr>
+          </a:lstStyle>
+          <a:p>
+            <a:pPr/>
+            <a:r>
+              <a:t>properties</a:t>
+            </a:r>
+          </a:p>
+        </p:txBody>
+      </p:sp>
+      <p:sp>
+        <p:nvSpPr>
+          <p:cNvPr id="255" name="Line"/>
+          <p:cNvSpPr/>
+          <p:nvPr/>
+        </p:nvSpPr>
+        <p:spPr>
+          <a:xfrm flipV="1">
+            <a:off x="9080500" y="5181599"/>
+            <a:ext cx="279401" cy="279402"/>
+          </a:xfrm>
+          <a:prstGeom prst="line">
+            <a:avLst/>
+          </a:prstGeom>
+          <a:ln w="25400">
+            <a:solidFill>
+              <a:schemeClr val="accent1"/>
+            </a:solidFill>
+            <a:miter lim="400000"/>
+          </a:ln>
+        </p:spPr>
+        <p:txBody>
+          <a:bodyPr lIns="50800" tIns="50800" rIns="50800" bIns="50800" anchor="ctr"/>
+          <a:lstStyle/>
+          <a:p>
+            <a:pPr algn="ctr">
+              <a:lnSpc>
+                <a:spcPct val="80000"/>
+              </a:lnSpc>
+              <a:spcBef>
+                <a:spcPts val="0"/>
+              </a:spcBef>
+              <a:defRPr cap="all" sz="2800">
+                <a:latin typeface="+mn-lt"/>
+                <a:ea typeface="+mn-ea"/>
+                <a:cs typeface="+mn-cs"/>
+                <a:sym typeface="DIN Condensed"/>
+              </a:defRPr>
+            </a:pPr>
+          </a:p>
+        </p:txBody>
+      </p:sp>
+      <p:sp>
+        <p:nvSpPr>
+          <p:cNvPr id="256" name="Line"/>
+          <p:cNvSpPr/>
+          <p:nvPr/>
+        </p:nvSpPr>
+        <p:spPr>
+          <a:xfrm flipH="1" flipV="1">
+            <a:off x="10085437" y="5153762"/>
+            <a:ext cx="385267" cy="280729"/>
+          </a:xfrm>
+          <a:prstGeom prst="line">
+            <a:avLst/>
+          </a:prstGeom>
+          <a:ln w="25400">
+            <a:solidFill>
+              <a:schemeClr val="accent1"/>
+            </a:solidFill>
+            <a:miter lim="400000"/>
+          </a:ln>
+        </p:spPr>
+        <p:txBody>
+          <a:bodyPr lIns="50800" tIns="50800" rIns="50800" bIns="50800" anchor="ctr"/>
+          <a:lstStyle/>
+          <a:p>
+            <a:pPr algn="ctr">
+              <a:lnSpc>
+                <a:spcPct val="80000"/>
+              </a:lnSpc>
+              <a:spcBef>
+                <a:spcPts val="0"/>
+              </a:spcBef>
+              <a:defRPr cap="all" sz="2800">
+                <a:latin typeface="+mn-lt"/>
+                <a:ea typeface="+mn-ea"/>
+                <a:cs typeface="+mn-cs"/>
+                <a:sym typeface="DIN Condensed"/>
+              </a:defRPr>
+            </a:pPr>
+          </a:p>
+        </p:txBody>
+      </p:sp>
+      <p:sp>
+        <p:nvSpPr>
+          <p:cNvPr id="257" name="prototype"/>
+          <p:cNvSpPr/>
+          <p:nvPr/>
+        </p:nvSpPr>
+        <p:spPr>
+          <a:xfrm>
+            <a:off x="9106679" y="6880577"/>
+            <a:ext cx="1270001" cy="457201"/>
+          </a:xfrm>
+          <a:prstGeom prst="rect">
+            <a:avLst/>
+          </a:prstGeom>
+          <a:solidFill>
+            <a:schemeClr val="accent1"/>
+          </a:solidFill>
+          <a:ln w="12700">
+            <a:miter lim="400000"/>
+          </a:ln>
+          <a:extLst>
+            <a:ext uri="{C572A759-6A51-4108-AA02-DFA0A04FC94B}">
+              <ma14:wrappingTextBoxFlag xmlns:ma14="http://schemas.microsoft.com/office/mac/drawingml/2011/main" val="1"/>
+            </a:ext>
+          </a:extLst>
+        </p:spPr>
+        <p:txBody>
+          <a:bodyPr lIns="50800" tIns="50800" rIns="50800" bIns="50800" anchor="ctr"/>
+          <a:lstStyle>
+            <a:lvl1pPr algn="ctr">
+              <a:lnSpc>
+                <a:spcPct val="80000"/>
+              </a:lnSpc>
+              <a:spcBef>
+                <a:spcPts val="0"/>
+              </a:spcBef>
+              <a:defRPr cap="all" sz="2400">
+                <a:solidFill>
+                  <a:srgbClr val="FFFFFF"/>
+                </a:solidFill>
+                <a:latin typeface="+mn-lt"/>
+                <a:ea typeface="+mn-ea"/>
+                <a:cs typeface="+mn-cs"/>
+                <a:sym typeface="DIN Condensed"/>
+              </a:defRPr>
+            </a:lvl1pPr>
+          </a:lstStyle>
+          <a:p>
+            <a:pPr/>
+            <a:r>
+              <a:t>prototype</a:t>
+            </a:r>
+          </a:p>
+        </p:txBody>
+      </p:sp>
+      <p:sp>
+        <p:nvSpPr>
+          <p:cNvPr id="258" name="Method"/>
+          <p:cNvSpPr/>
+          <p:nvPr/>
+        </p:nvSpPr>
+        <p:spPr>
+          <a:xfrm>
+            <a:off x="8140700" y="7577061"/>
+            <a:ext cx="1510705" cy="457201"/>
+          </a:xfrm>
+          <a:prstGeom prst="roundRect">
+            <a:avLst>
+              <a:gd name="adj" fmla="val 41667"/>
+            </a:avLst>
+          </a:prstGeom>
+          <a:solidFill>
+            <a:schemeClr val="accent1"/>
+          </a:solidFill>
+          <a:ln w="12700">
+            <a:miter lim="400000"/>
+          </a:ln>
+          <a:extLst>
+            <a:ext uri="{C572A759-6A51-4108-AA02-DFA0A04FC94B}">
+              <ma14:wrappingTextBoxFlag xmlns:ma14="http://schemas.microsoft.com/office/mac/drawingml/2011/main" val="1"/>
+            </a:ext>
+          </a:extLst>
+        </p:spPr>
+        <p:txBody>
+          <a:bodyPr lIns="50800" tIns="50800" rIns="50800" bIns="50800" anchor="ctr"/>
+          <a:lstStyle>
+            <a:lvl1pPr algn="ctr">
+              <a:lnSpc>
+                <a:spcPct val="80000"/>
+              </a:lnSpc>
+              <a:spcBef>
+                <a:spcPts val="0"/>
+              </a:spcBef>
+              <a:defRPr cap="all" sz="2200">
+                <a:solidFill>
+                  <a:srgbClr val="FFFFFF"/>
+                </a:solidFill>
+                <a:latin typeface="+mn-lt"/>
+                <a:ea typeface="+mn-ea"/>
+                <a:cs typeface="+mn-cs"/>
+                <a:sym typeface="DIN Condensed"/>
+              </a:defRPr>
+            </a:lvl1pPr>
+          </a:lstStyle>
+          <a:p>
+            <a:pPr/>
+            <a:r>
+              <a:t>Method</a:t>
+            </a:r>
+          </a:p>
+        </p:txBody>
+      </p:sp>
+      <p:sp>
+        <p:nvSpPr>
+          <p:cNvPr id="259" name="properties"/>
+          <p:cNvSpPr/>
+          <p:nvPr/>
+        </p:nvSpPr>
+        <p:spPr>
+          <a:xfrm>
+            <a:off x="10147300" y="7577061"/>
+            <a:ext cx="1510705" cy="457201"/>
+          </a:xfrm>
+          <a:prstGeom prst="roundRect">
+            <a:avLst>
+              <a:gd name="adj" fmla="val 41667"/>
+            </a:avLst>
+          </a:prstGeom>
+          <a:solidFill>
+            <a:schemeClr val="accent1"/>
+          </a:solidFill>
+          <a:ln w="12700">
+            <a:miter lim="400000"/>
+          </a:ln>
+          <a:extLst>
+            <a:ext uri="{C572A759-6A51-4108-AA02-DFA0A04FC94B}">
+              <ma14:wrappingTextBoxFlag xmlns:ma14="http://schemas.microsoft.com/office/mac/drawingml/2011/main" val="1"/>
+            </a:ext>
+          </a:extLst>
+        </p:spPr>
+        <p:txBody>
+          <a:bodyPr lIns="50800" tIns="50800" rIns="50800" bIns="50800" anchor="ctr"/>
+          <a:lstStyle>
+            <a:lvl1pPr algn="ctr">
+              <a:lnSpc>
+                <a:spcPct val="80000"/>
+              </a:lnSpc>
+              <a:spcBef>
+                <a:spcPts val="0"/>
+              </a:spcBef>
+              <a:defRPr cap="all" sz="2200">
+                <a:solidFill>
+                  <a:srgbClr val="FFFFFF"/>
+                </a:solidFill>
+                <a:latin typeface="+mn-lt"/>
+                <a:ea typeface="+mn-ea"/>
+                <a:cs typeface="+mn-cs"/>
+                <a:sym typeface="DIN Condensed"/>
+              </a:defRPr>
+            </a:lvl1pPr>
+          </a:lstStyle>
+          <a:p>
+            <a:pPr/>
+            <a:r>
+              <a:t>properties</a:t>
+            </a:r>
+          </a:p>
+        </p:txBody>
+      </p:sp>
+      <p:sp>
+        <p:nvSpPr>
+          <p:cNvPr id="260" name="Line"/>
+          <p:cNvSpPr/>
+          <p:nvPr/>
+        </p:nvSpPr>
+        <p:spPr>
+          <a:xfrm flipV="1">
+            <a:off x="9080500" y="7340599"/>
+            <a:ext cx="279401" cy="279402"/>
+          </a:xfrm>
+          <a:prstGeom prst="line">
+            <a:avLst/>
+          </a:prstGeom>
+          <a:ln w="25400">
+            <a:solidFill>
+              <a:schemeClr val="accent1"/>
+            </a:solidFill>
+            <a:miter lim="400000"/>
+          </a:ln>
+        </p:spPr>
+        <p:txBody>
+          <a:bodyPr lIns="50800" tIns="50800" rIns="50800" bIns="50800" anchor="ctr"/>
+          <a:lstStyle/>
+          <a:p>
+            <a:pPr algn="ctr">
+              <a:lnSpc>
+                <a:spcPct val="80000"/>
+              </a:lnSpc>
+              <a:spcBef>
+                <a:spcPts val="0"/>
+              </a:spcBef>
+              <a:defRPr cap="all" sz="2800">
+                <a:latin typeface="+mn-lt"/>
+                <a:ea typeface="+mn-ea"/>
+                <a:cs typeface="+mn-cs"/>
+                <a:sym typeface="DIN Condensed"/>
+              </a:defRPr>
+            </a:pPr>
+          </a:p>
+        </p:txBody>
+      </p:sp>
+      <p:sp>
+        <p:nvSpPr>
+          <p:cNvPr id="261" name="Line"/>
+          <p:cNvSpPr/>
+          <p:nvPr/>
+        </p:nvSpPr>
+        <p:spPr>
+          <a:xfrm flipH="1" flipV="1">
+            <a:off x="10085437" y="7312762"/>
+            <a:ext cx="385267" cy="280729"/>
+          </a:xfrm>
+          <a:prstGeom prst="line">
+            <a:avLst/>
+          </a:prstGeom>
+          <a:ln w="25400">
+            <a:solidFill>
+              <a:schemeClr val="accent1"/>
+            </a:solidFill>
+            <a:miter lim="400000"/>
+          </a:ln>
+        </p:spPr>
+        <p:txBody>
+          <a:bodyPr lIns="50800" tIns="50800" rIns="50800" bIns="50800" anchor="ctr"/>
+          <a:lstStyle/>
+          <a:p>
+            <a:pPr algn="ctr">
+              <a:lnSpc>
+                <a:spcPct val="80000"/>
+              </a:lnSpc>
+              <a:spcBef>
+                <a:spcPts val="0"/>
+              </a:spcBef>
+              <a:defRPr cap="all" sz="2800">
+                <a:latin typeface="+mn-lt"/>
+                <a:ea typeface="+mn-ea"/>
+                <a:cs typeface="+mn-cs"/>
+                <a:sym typeface="DIN Condensed"/>
+              </a:defRPr>
+            </a:pPr>
+          </a:p>
+        </p:txBody>
+      </p:sp>
+      <p:sp>
+        <p:nvSpPr>
+          <p:cNvPr id="262" name="Line"/>
+          <p:cNvSpPr/>
+          <p:nvPr/>
+        </p:nvSpPr>
+        <p:spPr>
+          <a:xfrm>
+            <a:off x="7008620" y="4950177"/>
+            <a:ext cx="2173480" cy="1"/>
+          </a:xfrm>
+          <a:prstGeom prst="line">
+            <a:avLst/>
+          </a:prstGeom>
+          <a:ln w="25400">
+            <a:solidFill>
+              <a:schemeClr val="accent1"/>
+            </a:solidFill>
+            <a:miter lim="400000"/>
+            <a:tailEnd type="triangle"/>
+          </a:ln>
+        </p:spPr>
+        <p:txBody>
+          <a:bodyPr lIns="50800" tIns="50800" rIns="50800" bIns="50800" anchor="ctr"/>
+          <a:lstStyle/>
+          <a:p>
+            <a:pPr algn="ctr">
+              <a:lnSpc>
+                <a:spcPct val="80000"/>
+              </a:lnSpc>
+              <a:spcBef>
+                <a:spcPts val="0"/>
+              </a:spcBef>
+              <a:defRPr cap="all" sz="2800">
+                <a:latin typeface="+mn-lt"/>
+                <a:ea typeface="+mn-ea"/>
+                <a:cs typeface="+mn-cs"/>
+                <a:sym typeface="DIN Condensed"/>
+              </a:defRPr>
+            </a:pPr>
+          </a:p>
+        </p:txBody>
+      </p:sp>
+      <p:sp>
+        <p:nvSpPr>
+          <p:cNvPr id="263" name="Line"/>
+          <p:cNvSpPr/>
+          <p:nvPr/>
+        </p:nvSpPr>
+        <p:spPr>
+          <a:xfrm>
+            <a:off x="7008620" y="7109177"/>
+            <a:ext cx="2173480" cy="1"/>
+          </a:xfrm>
+          <a:prstGeom prst="line">
+            <a:avLst/>
+          </a:prstGeom>
+          <a:ln w="25400">
+            <a:solidFill>
+              <a:schemeClr val="accent1"/>
+            </a:solidFill>
+            <a:miter lim="400000"/>
+            <a:tailEnd type="triangle"/>
+          </a:ln>
+        </p:spPr>
+        <p:txBody>
+          <a:bodyPr lIns="50800" tIns="50800" rIns="50800" bIns="50800" anchor="ctr"/>
+          <a:lstStyle/>
+          <a:p>
+            <a:pPr algn="ctr">
+              <a:lnSpc>
+                <a:spcPct val="80000"/>
+              </a:lnSpc>
+              <a:spcBef>
+                <a:spcPts val="0"/>
+              </a:spcBef>
+              <a:defRPr cap="all" sz="2800">
+                <a:latin typeface="+mn-lt"/>
+                <a:ea typeface="+mn-ea"/>
+                <a:cs typeface="+mn-cs"/>
+                <a:sym typeface="DIN Condensed"/>
+              </a:defRPr>
+            </a:pPr>
+          </a:p>
+        </p:txBody>
+      </p:sp>
+    </p:spTree>
+  </p:cSld>
+  <p:clrMapOvr>
+    <a:masterClrMapping/>
+  </p:clrMapOvr>
+  <p:transition xmlns:p14="http://schemas.microsoft.com/office/powerpoint/2010/main" spd="med" advClick="1"/>
+</p:sld>
+</file>
+
 <file path=ppt/slides/slide2.xml><?xml version="1.0" encoding="utf-8"?>
 <p:sld xmlns:a="http://schemas.openxmlformats.org/drawingml/2006/main" xmlns:r="http://schemas.openxmlformats.org/officeDocument/2006/relationships" xmlns:p="http://schemas.openxmlformats.org/presentationml/2006/main" showMasterSp="1" showMasterPhAnim="1">
   <p:cSld>

</xml_diff>